<commit_message>
Made minor changes to comp and poster
</commit_message>
<xml_diff>
--- a/Senior/Thesis/Thesis Document/Poster/licastb_poster.pptx
+++ b/Senior/Thesis/Thesis Document/Poster/licastb_poster.pptx
@@ -226,7 +226,7 @@
             <a:fld id="{D9B4BE8C-1C96-469A-84FD-5AAEAF4A58B1}" type="datetimeFigureOut">
               <a:rPr lang="en-US" smtClean="0"/>
               <a:pPr/>
-              <a:t>4/11/2014</a:t>
+              <a:t>4/13/2014</a:t>
             </a:fld>
             <a:endParaRPr lang="en-US"/>
           </a:p>
@@ -388,7 +388,7 @@
             <a:fld id="{8DC8B27C-975C-42A0-BCBC-A5FB229B0A17}" type="datetimeFigureOut">
               <a:rPr lang="en-US" smtClean="0"/>
               <a:pPr/>
-              <a:t>4/11/2014</a:t>
+              <a:t>4/13/2014</a:t>
             </a:fld>
             <a:endParaRPr lang="en-US"/>
           </a:p>
@@ -4399,7 +4399,7 @@
             </a:pPr>
             <a:r>
               <a:rPr lang="en-US" sz="4000" dirty="0" smtClean="0"/>
-              <a:t>Processing times increased, but remained less than two seconds in all observed scenarios as seen in Figure 3.</a:t>
+              <a:t>Processing times increased, but remained less than two seconds in observed scenarios, as seen in Figure 3.</a:t>
             </a:r>
           </a:p>
         </p:txBody>
@@ -4526,15 +4526,7 @@
                   <a:srgbClr val="FFC000"/>
                 </a:solidFill>
               </a:rPr>
-              <a:t>http://skynetgds.no-ip.biz/srthesis			</a:t>
-            </a:r>
-            <a:r>
-              <a:rPr lang="en-US" sz="4800" smtClean="0">
-                <a:solidFill>
-                  <a:srgbClr val="FFC000"/>
-                </a:solidFill>
-              </a:rPr>
-              <a:t>										</a:t>
+              <a:t>http://skynetgds.no-ip.biz/srthesis																	</a:t>
             </a:r>
             <a:r>
               <a:rPr lang="en-US" sz="4800" dirty="0" smtClean="0">
@@ -4542,7 +4534,15 @@
                   <a:srgbClr val="FFC000"/>
                 </a:solidFill>
               </a:rPr>
-              <a:t>				Contact Author: Braden D. Licastro &lt;licastb@allegheny.edu&gt; </a:t>
+              <a:t>  Contact </a:t>
+            </a:r>
+            <a:r>
+              <a:rPr lang="en-US" sz="4800" dirty="0" smtClean="0">
+                <a:solidFill>
+                  <a:srgbClr val="FFC000"/>
+                </a:solidFill>
+              </a:rPr>
+              <a:t>Author: Braden D. Licastro &lt;licastb@allegheny.edu&gt; </a:t>
             </a:r>
             <a:endParaRPr lang="en-US" sz="6000" dirty="0">
               <a:solidFill>
@@ -5282,7 +5282,23 @@
             </a:pPr>
             <a:r>
               <a:rPr lang="en-US" sz="4000" dirty="0" smtClean="0"/>
-              <a:t>Detects identical files by determining the number of times each color occurs averaged over the image and creates an MD5 hash from the resulting counts. </a:t>
+              <a:t>Detects identical files by determining the </a:t>
+            </a:r>
+            <a:r>
+              <a:rPr lang="en-US" sz="4000" dirty="0" smtClean="0"/>
+              <a:t>average number </a:t>
+            </a:r>
+            <a:r>
+              <a:rPr lang="en-US" sz="4000" dirty="0" smtClean="0"/>
+              <a:t>of times each color </a:t>
+            </a:r>
+            <a:r>
+              <a:rPr lang="en-US" sz="4000" dirty="0" smtClean="0"/>
+              <a:t>occurs, </a:t>
+            </a:r>
+            <a:r>
+              <a:rPr lang="en-US" sz="4000" dirty="0" smtClean="0"/>
+              <a:t>and creates an MD5 hash from the resulting counts. </a:t>
             </a:r>
           </a:p>
           <a:p>
@@ -5324,32 +5340,6 @@
           </a:p>
         </p:txBody>
       </p:sp>
-      <p:pic>
-        <p:nvPicPr>
-          <p:cNvPr id="5" name="Picture 2" descr="C:\Users\Braden\SkyCloud\Screenshot (5).png"/>
-          <p:cNvPicPr>
-            <a:picLocks noChangeAspect="1" noChangeArrowheads="1"/>
-          </p:cNvPicPr>
-          <p:nvPr/>
-        </p:nvPicPr>
-        <p:blipFill>
-          <a:blip r:embed="rId9" cstate="print"/>
-          <a:srcRect l="1352" t="2222" r="1972" b="2222"/>
-          <a:stretch>
-            <a:fillRect/>
-          </a:stretch>
-        </p:blipFill>
-        <p:spPr bwMode="auto">
-          <a:xfrm>
-            <a:off x="30251400" y="13288641"/>
-            <a:ext cx="11353800" cy="6828159"/>
-          </a:xfrm>
-          <a:prstGeom prst="rect">
-            <a:avLst/>
-          </a:prstGeom>
-          <a:noFill/>
-        </p:spPr>
-      </p:pic>
       <p:sp>
         <p:nvSpPr>
           <p:cNvPr id="32" name="Text Box 6"/>
@@ -5360,7 +5350,7 @@
         </p:nvSpPr>
         <p:spPr bwMode="auto">
           <a:xfrm>
-            <a:off x="29655052" y="20132676"/>
+            <a:off x="29655052" y="19142076"/>
             <a:ext cx="12940748" cy="669924"/>
           </a:xfrm>
           <a:prstGeom prst="rect">
@@ -5419,7 +5409,7 @@
         </p:nvSpPr>
         <p:spPr bwMode="auto">
           <a:xfrm>
-            <a:off x="29515790" y="20878800"/>
+            <a:off x="29515790" y="20193000"/>
             <a:ext cx="13702748" cy="5486400"/>
           </a:xfrm>
           <a:prstGeom prst="rect">
@@ -5480,7 +5470,7 @@
             </a:pPr>
             <a:r>
               <a:rPr lang="en-US" sz="4000" dirty="0" smtClean="0"/>
-              <a:t>Test data containing an average of 20% duplicate was reduced by 12% once processed using the detection algorithm. This equates to $1.08 million in savings annually.</a:t>
+              <a:t>Test data containing an average of 20% duplicate data was reduced by 12% once processed using the detection algorithm. This equates to $1.08 million in savings annually.</a:t>
             </a:r>
           </a:p>
           <a:p>
@@ -5503,7 +5493,7 @@
         </p:nvSpPr>
         <p:spPr bwMode="auto">
           <a:xfrm>
-            <a:off x="29565600" y="26441400"/>
+            <a:off x="29565600" y="25908000"/>
             <a:ext cx="13358191" cy="1371600"/>
           </a:xfrm>
           <a:prstGeom prst="rect">
@@ -5540,7 +5530,7 @@
         </p:nvSpPr>
         <p:spPr bwMode="auto">
           <a:xfrm>
-            <a:off x="30519757" y="26670000"/>
+            <a:off x="30519757" y="26136600"/>
             <a:ext cx="11446565" cy="914400"/>
           </a:xfrm>
           <a:prstGeom prst="rect">
@@ -5582,7 +5572,7 @@
         </p:nvSpPr>
         <p:spPr bwMode="auto">
           <a:xfrm>
-            <a:off x="29502652" y="27965400"/>
+            <a:off x="29502652" y="27584400"/>
             <a:ext cx="13702748" cy="1828800"/>
           </a:xfrm>
           <a:prstGeom prst="rect">
@@ -5676,6 +5666,32 @@
           </a:p>
         </p:txBody>
       </p:sp>
+      <p:pic>
+        <p:nvPicPr>
+          <p:cNvPr id="1027" name="Picture 3" descr="C:\Users\Braden\Documents\College\Senior\Thesis\Thesis Document\Poster\time_graph.png"/>
+          <p:cNvPicPr>
+            <a:picLocks noChangeAspect="1" noChangeArrowheads="1"/>
+          </p:cNvPicPr>
+          <p:nvPr/>
+        </p:nvPicPr>
+        <p:blipFill>
+          <a:blip r:embed="rId9" cstate="print"/>
+          <a:srcRect/>
+          <a:stretch>
+            <a:fillRect/>
+          </a:stretch>
+        </p:blipFill>
+        <p:spPr bwMode="auto">
+          <a:xfrm>
+            <a:off x="29870400" y="13411200"/>
+            <a:ext cx="12310714" cy="5638800"/>
+          </a:xfrm>
+          <a:prstGeom prst="rect">
+            <a:avLst/>
+          </a:prstGeom>
+          <a:noFill/>
+        </p:spPr>
+      </p:pic>
     </p:spTree>
   </p:cSld>
   <p:clrMapOvr>

</xml_diff>

<commit_message>
Poster update, working on thesis defense presentation.
</commit_message>
<xml_diff>
--- a/Senior/Thesis/Thesis Document/Poster/licastb_poster.pptx
+++ b/Senior/Thesis/Thesis Document/Poster/licastb_poster.pptx
@@ -226,7 +226,7 @@
             <a:fld id="{D9B4BE8C-1C96-469A-84FD-5AAEAF4A58B1}" type="datetimeFigureOut">
               <a:rPr lang="en-US" smtClean="0"/>
               <a:pPr/>
-              <a:t>4/13/2014</a:t>
+              <a:t>4/14/2014</a:t>
             </a:fld>
             <a:endParaRPr lang="en-US"/>
           </a:p>
@@ -388,7 +388,7 @@
             <a:fld id="{8DC8B27C-975C-42A0-BCBC-A5FB229B0A17}" type="datetimeFigureOut">
               <a:rPr lang="en-US" smtClean="0"/>
               <a:pPr/>
-              <a:t>4/13/2014</a:t>
+              <a:t>4/14/2014</a:t>
             </a:fld>
             <a:endParaRPr lang="en-US"/>
           </a:p>
@@ -557,7 +557,7 @@
     </p:spTree>
     <p:extLst>
       <p:ext uri="{BB962C8B-B14F-4D97-AF65-F5344CB8AC3E}">
-        <p14:creationId xmlns="" xmlns:p14="http://schemas.microsoft.com/office/powerpoint/2010/main" val="4021353523"/>
+        <p14:creationId xmlns:p14="http://schemas.microsoft.com/office/powerpoint/2010/main" xmlns="" val="4021353523"/>
       </p:ext>
     </p:extLst>
   </p:cSld>
@@ -3969,7 +3969,39 @@
                   <a:srgbClr val="FFC000"/>
                 </a:solidFill>
               </a:rPr>
-              <a:t>Braden D. Licastro and Professor Robert S. Roos</a:t>
+              <a:t>Braden D. Licastro </a:t>
+            </a:r>
+            <a:r>
+              <a:rPr lang="en-US" sz="6000" dirty="0" smtClean="0">
+                <a:solidFill>
+                  <a:srgbClr val="FFC000"/>
+                </a:solidFill>
+              </a:rPr>
+              <a:t>(Professor </a:t>
+            </a:r>
+            <a:r>
+              <a:rPr lang="en-US" sz="6000" dirty="0" smtClean="0">
+                <a:solidFill>
+                  <a:srgbClr val="FFC000"/>
+                </a:solidFill>
+              </a:rPr>
+              <a:t>Robert S. </a:t>
+            </a:r>
+            <a:r>
+              <a:rPr lang="en-US" sz="6000" dirty="0" err="1" smtClean="0">
+                <a:solidFill>
+                  <a:srgbClr val="FFC000"/>
+                </a:solidFill>
+              </a:rPr>
+              <a:t>Roos</a:t>
+            </a:r>
+            <a:r>
+              <a:rPr lang="en-US" sz="6000" dirty="0" smtClean="0">
+                <a:solidFill>
+                  <a:srgbClr val="FFC000"/>
+                </a:solidFill>
+              </a:rPr>
+              <a:t>, Project Advisor)</a:t>
             </a:r>
             <a:r>
               <a:rPr lang="en-US" sz="6000" dirty="0" smtClean="0"/>
@@ -4526,23 +4558,7 @@
                   <a:srgbClr val="FFC000"/>
                 </a:solidFill>
               </a:rPr>
-              <a:t>http://skynetgds.no-ip.biz/srthesis																	</a:t>
-            </a:r>
-            <a:r>
-              <a:rPr lang="en-US" sz="4800" dirty="0" smtClean="0">
-                <a:solidFill>
-                  <a:srgbClr val="FFC000"/>
-                </a:solidFill>
-              </a:rPr>
-              <a:t>  Contact </a:t>
-            </a:r>
-            <a:r>
-              <a:rPr lang="en-US" sz="4800" dirty="0" smtClean="0">
-                <a:solidFill>
-                  <a:srgbClr val="FFC000"/>
-                </a:solidFill>
-              </a:rPr>
-              <a:t>Author: Braden D. Licastro &lt;licastb@allegheny.edu&gt; </a:t>
+              <a:t>http://skynetgds.no-ip.biz/srthesis																	  Contact Author: Braden D. Licastro &lt;licastb@allegheny.edu&gt; </a:t>
             </a:r>
             <a:endParaRPr lang="en-US" sz="6000" dirty="0">
               <a:solidFill>
@@ -4578,7 +4594,7 @@
             <a:blip r:embed="rId4" cstate="print">
               <a:extLst>
                 <a:ext uri="{28A0092B-C50C-407E-A947-70E740481C1C}">
-                  <a14:useLocalDpi xmlns="" xmlns:a14="http://schemas.microsoft.com/office/drawing/2010/main" val="0"/>
+                  <a14:useLocalDpi xmlns:a14="http://schemas.microsoft.com/office/drawing/2010/main" xmlns="" val="0"/>
                 </a:ext>
               </a:extLst>
             </a:blip>
@@ -4598,7 +4614,7 @@
             <a:noFill/>
             <a:extLst>
               <a:ext uri="{909E8E84-426E-40DD-AFC4-6F175D3DCCD1}">
-                <a14:hiddenFill xmlns="" xmlns:a14="http://schemas.microsoft.com/office/drawing/2010/main">
+                <a14:hiddenFill xmlns:a14="http://schemas.microsoft.com/office/drawing/2010/main" xmlns="">
                   <a:solidFill>
                     <a:srgbClr val="FFFFFF"/>
                   </a:solidFill>
@@ -4619,7 +4635,7 @@
             <a:blip r:embed="rId5" cstate="print">
               <a:extLst>
                 <a:ext uri="{28A0092B-C50C-407E-A947-70E740481C1C}">
-                  <a14:useLocalDpi xmlns="" xmlns:a14="http://schemas.microsoft.com/office/drawing/2010/main" val="0"/>
+                  <a14:useLocalDpi xmlns:a14="http://schemas.microsoft.com/office/drawing/2010/main" xmlns="" val="0"/>
                 </a:ext>
               </a:extLst>
             </a:blip>
@@ -4639,7 +4655,7 @@
             <a:noFill/>
             <a:extLst>
               <a:ext uri="{909E8E84-426E-40DD-AFC4-6F175D3DCCD1}">
-                <a14:hiddenFill xmlns="" xmlns:a14="http://schemas.microsoft.com/office/drawing/2010/main">
+                <a14:hiddenFill xmlns:a14="http://schemas.microsoft.com/office/drawing/2010/main" xmlns="">
                   <a:solidFill>
                     <a:srgbClr val="FFFFFF"/>
                   </a:solidFill>
@@ -4670,7 +4686,7 @@
               </a:clrChange>
               <a:extLst>
                 <a:ext uri="{28A0092B-C50C-407E-A947-70E740481C1C}">
-                  <a14:useLocalDpi xmlns="" xmlns:a14="http://schemas.microsoft.com/office/drawing/2010/main" val="0"/>
+                  <a14:useLocalDpi xmlns:a14="http://schemas.microsoft.com/office/drawing/2010/main" xmlns="" val="0"/>
                 </a:ext>
               </a:extLst>
             </a:blip>
@@ -4690,7 +4706,7 @@
             <a:noFill/>
             <a:extLst>
               <a:ext uri="{909E8E84-426E-40DD-AFC4-6F175D3DCCD1}">
-                <a14:hiddenFill xmlns="" xmlns:a14="http://schemas.microsoft.com/office/drawing/2010/main">
+                <a14:hiddenFill xmlns:a14="http://schemas.microsoft.com/office/drawing/2010/main" xmlns="">
                   <a:solidFill>
                     <a:srgbClr val="FFFFFF"/>
                   </a:solidFill>
@@ -4711,7 +4727,7 @@
             <a:blip r:embed="rId7" cstate="print">
               <a:extLst>
                 <a:ext uri="{28A0092B-C50C-407E-A947-70E740481C1C}">
-                  <a14:useLocalDpi xmlns="" xmlns:a14="http://schemas.microsoft.com/office/drawing/2010/main" val="0"/>
+                  <a14:useLocalDpi xmlns:a14="http://schemas.microsoft.com/office/drawing/2010/main" xmlns="" val="0"/>
                 </a:ext>
               </a:extLst>
             </a:blip>
@@ -4731,7 +4747,7 @@
             <a:noFill/>
             <a:extLst>
               <a:ext uri="{909E8E84-426E-40DD-AFC4-6F175D3DCCD1}">
-                <a14:hiddenFill xmlns="" xmlns:a14="http://schemas.microsoft.com/office/drawing/2010/main">
+                <a14:hiddenFill xmlns:a14="http://schemas.microsoft.com/office/drawing/2010/main" xmlns="">
                   <a:solidFill>
                     <a:srgbClr val="FFFFFF"/>
                   </a:solidFill>
@@ -5091,40 +5107,46 @@
             </a:r>
           </a:p>
           <a:p>
-            <a:pPr algn="ctr">
+            <a:pPr indent="465138">
               <a:spcBef>
                 <a:spcPct val="50000"/>
               </a:spcBef>
+              <a:buFont typeface="Arial" pitchFamily="34" charset="0"/>
+              <a:buChar char="•"/>
             </a:pPr>
             <a:r>
               <a:rPr lang="en-US" sz="4000" b="1" dirty="0" smtClean="0"/>
-              <a:t>File size restrictions	Compression technologies</a:t>
-            </a:r>
-          </a:p>
-          <a:p>
-            <a:pPr algn="ctr">
+              <a:t>File size restrictions</a:t>
+            </a:r>
+          </a:p>
+          <a:p>
+            <a:pPr indent="465138">
               <a:spcBef>
                 <a:spcPct val="50000"/>
               </a:spcBef>
+              <a:buFont typeface="Arial" pitchFamily="34" charset="0"/>
+              <a:buChar char="•"/>
             </a:pPr>
             <a:r>
               <a:rPr lang="en-US" sz="4000" b="1" dirty="0" smtClean="0"/>
-              <a:t>Upload expiration times		Per-user restrictions</a:t>
-            </a:r>
-          </a:p>
-          <a:p>
-            <a:pPr algn="ctr">
+              <a:t>Per-user restrictions</a:t>
+            </a:r>
+          </a:p>
+          <a:p>
+            <a:pPr indent="465138">
               <a:spcBef>
                 <a:spcPct val="50000"/>
               </a:spcBef>
+              <a:buFont typeface="Arial" pitchFamily="34" charset="0"/>
+              <a:buChar char="•"/>
             </a:pPr>
             <a:r>
-              <a:rPr lang="en-US" sz="4000" b="1" dirty="0"/>
-              <a:t>a</a:t>
-            </a:r>
-            <a:r>
               <a:rPr lang="en-US" sz="4000" b="1" dirty="0" smtClean="0"/>
-              <a:t>nd Subscription services</a:t>
+              <a:t>Subscription </a:t>
+            </a:r>
+            <a:r>
+              <a:rPr lang="en-US" sz="4000" b="1" dirty="0" smtClean="0"/>
+              <a:t>services</a:t>
             </a:r>
             <a:endParaRPr lang="en-US" sz="4000" b="1" dirty="0"/>
           </a:p>
@@ -5282,23 +5304,7 @@
             </a:pPr>
             <a:r>
               <a:rPr lang="en-US" sz="4000" dirty="0" smtClean="0"/>
-              <a:t>Detects identical files by determining the </a:t>
-            </a:r>
-            <a:r>
-              <a:rPr lang="en-US" sz="4000" dirty="0" smtClean="0"/>
-              <a:t>average number </a:t>
-            </a:r>
-            <a:r>
-              <a:rPr lang="en-US" sz="4000" dirty="0" smtClean="0"/>
-              <a:t>of times each color </a:t>
-            </a:r>
-            <a:r>
-              <a:rPr lang="en-US" sz="4000" dirty="0" smtClean="0"/>
-              <a:t>occurs, </a:t>
-            </a:r>
-            <a:r>
-              <a:rPr lang="en-US" sz="4000" dirty="0" smtClean="0"/>
-              <a:t>and creates an MD5 hash from the resulting counts. </a:t>
+              <a:t>Detects identical files by determining the average number of times each color occurs, and creates an MD5 hash from the resulting counts. </a:t>
             </a:r>
           </a:p>
           <a:p>
@@ -5692,6 +5698,60 @@
           <a:noFill/>
         </p:spPr>
       </p:pic>
+      <p:sp>
+        <p:nvSpPr>
+          <p:cNvPr id="37" name="TextBox 36"/>
+          <p:cNvSpPr txBox="1"/>
+          <p:nvPr/>
+        </p:nvSpPr>
+        <p:spPr>
+          <a:xfrm>
+            <a:off x="7162800" y="27279600"/>
+            <a:ext cx="7239000" cy="1631216"/>
+          </a:xfrm>
+          <a:prstGeom prst="rect">
+            <a:avLst/>
+          </a:prstGeom>
+          <a:noFill/>
+        </p:spPr>
+        <p:txBody>
+          <a:bodyPr wrap="square" rtlCol="0">
+            <a:spAutoFit/>
+          </a:bodyPr>
+          <a:lstStyle/>
+          <a:p>
+            <a:pPr indent="465138">
+              <a:buFont typeface="Arial" pitchFamily="34" charset="0"/>
+              <a:buChar char="•"/>
+            </a:pPr>
+            <a:r>
+              <a:rPr lang="en-US" sz="4000" b="1" dirty="0" smtClean="0"/>
+              <a:t>File upload compression</a:t>
+            </a:r>
+          </a:p>
+          <a:p>
+            <a:pPr indent="465138">
+              <a:spcBef>
+                <a:spcPts val="2400"/>
+              </a:spcBef>
+              <a:buFont typeface="Arial" pitchFamily="34" charset="0"/>
+              <a:buChar char="•"/>
+            </a:pPr>
+            <a:r>
+              <a:rPr lang="en-US" sz="4000" b="1" dirty="0" smtClean="0"/>
+              <a:t>Upload </a:t>
+            </a:r>
+            <a:r>
+              <a:rPr lang="en-US" sz="4000" b="1" dirty="0" smtClean="0"/>
+              <a:t>expiration </a:t>
+            </a:r>
+            <a:r>
+              <a:rPr lang="en-US" sz="4000" b="1" dirty="0" smtClean="0"/>
+              <a:t>times</a:t>
+            </a:r>
+          </a:p>
+        </p:txBody>
+      </p:sp>
     </p:spTree>
   </p:cSld>
   <p:clrMapOvr>

</xml_diff>

<commit_message>
Hopefully the last poster change!
</commit_message>
<xml_diff>
--- a/Senior/Thesis/Thesis Document/Poster/licastb_poster.pptx
+++ b/Senior/Thesis/Thesis Document/Poster/licastb_poster.pptx
@@ -557,7 +557,7 @@
     </p:spTree>
     <p:extLst>
       <p:ext uri="{BB962C8B-B14F-4D97-AF65-F5344CB8AC3E}">
-        <p14:creationId xmlns:p14="http://schemas.microsoft.com/office/powerpoint/2010/main" xmlns="" val="4021353523"/>
+        <p14:creationId xmlns="" xmlns:p14="http://schemas.microsoft.com/office/powerpoint/2010/main" val="4021353523"/>
       </p:ext>
     </p:extLst>
   </p:cSld>
@@ -3969,23 +3969,7 @@
                   <a:srgbClr val="FFC000"/>
                 </a:solidFill>
               </a:rPr>
-              <a:t>Braden D. Licastro </a:t>
-            </a:r>
-            <a:r>
-              <a:rPr lang="en-US" sz="6000" dirty="0" smtClean="0">
-                <a:solidFill>
-                  <a:srgbClr val="FFC000"/>
-                </a:solidFill>
-              </a:rPr>
-              <a:t>(Professor </a:t>
-            </a:r>
-            <a:r>
-              <a:rPr lang="en-US" sz="6000" dirty="0" smtClean="0">
-                <a:solidFill>
-                  <a:srgbClr val="FFC000"/>
-                </a:solidFill>
-              </a:rPr>
-              <a:t>Robert S. </a:t>
+              <a:t>Braden D. Licastro (Professor Robert S. </a:t>
             </a:r>
             <a:r>
               <a:rPr lang="en-US" sz="6000" dirty="0" err="1" smtClean="0">
@@ -4594,7 +4578,7 @@
             <a:blip r:embed="rId4" cstate="print">
               <a:extLst>
                 <a:ext uri="{28A0092B-C50C-407E-A947-70E740481C1C}">
-                  <a14:useLocalDpi xmlns:a14="http://schemas.microsoft.com/office/drawing/2010/main" xmlns="" val="0"/>
+                  <a14:useLocalDpi xmlns="" xmlns:a14="http://schemas.microsoft.com/office/drawing/2010/main" val="0"/>
                 </a:ext>
               </a:extLst>
             </a:blip>
@@ -4614,7 +4598,7 @@
             <a:noFill/>
             <a:extLst>
               <a:ext uri="{909E8E84-426E-40DD-AFC4-6F175D3DCCD1}">
-                <a14:hiddenFill xmlns:a14="http://schemas.microsoft.com/office/drawing/2010/main" xmlns="">
+                <a14:hiddenFill xmlns="" xmlns:a14="http://schemas.microsoft.com/office/drawing/2010/main">
                   <a:solidFill>
                     <a:srgbClr val="FFFFFF"/>
                   </a:solidFill>
@@ -4635,7 +4619,7 @@
             <a:blip r:embed="rId5" cstate="print">
               <a:extLst>
                 <a:ext uri="{28A0092B-C50C-407E-A947-70E740481C1C}">
-                  <a14:useLocalDpi xmlns:a14="http://schemas.microsoft.com/office/drawing/2010/main" xmlns="" val="0"/>
+                  <a14:useLocalDpi xmlns="" xmlns:a14="http://schemas.microsoft.com/office/drawing/2010/main" val="0"/>
                 </a:ext>
               </a:extLst>
             </a:blip>
@@ -4655,7 +4639,7 @@
             <a:noFill/>
             <a:extLst>
               <a:ext uri="{909E8E84-426E-40DD-AFC4-6F175D3DCCD1}">
-                <a14:hiddenFill xmlns:a14="http://schemas.microsoft.com/office/drawing/2010/main" xmlns="">
+                <a14:hiddenFill xmlns="" xmlns:a14="http://schemas.microsoft.com/office/drawing/2010/main">
                   <a:solidFill>
                     <a:srgbClr val="FFFFFF"/>
                   </a:solidFill>
@@ -4686,7 +4670,7 @@
               </a:clrChange>
               <a:extLst>
                 <a:ext uri="{28A0092B-C50C-407E-A947-70E740481C1C}">
-                  <a14:useLocalDpi xmlns:a14="http://schemas.microsoft.com/office/drawing/2010/main" xmlns="" val="0"/>
+                  <a14:useLocalDpi xmlns="" xmlns:a14="http://schemas.microsoft.com/office/drawing/2010/main" val="0"/>
                 </a:ext>
               </a:extLst>
             </a:blip>
@@ -4706,7 +4690,7 @@
             <a:noFill/>
             <a:extLst>
               <a:ext uri="{909E8E84-426E-40DD-AFC4-6F175D3DCCD1}">
-                <a14:hiddenFill xmlns:a14="http://schemas.microsoft.com/office/drawing/2010/main" xmlns="">
+                <a14:hiddenFill xmlns="" xmlns:a14="http://schemas.microsoft.com/office/drawing/2010/main">
                   <a:solidFill>
                     <a:srgbClr val="FFFFFF"/>
                   </a:solidFill>
@@ -4727,7 +4711,7 @@
             <a:blip r:embed="rId7" cstate="print">
               <a:extLst>
                 <a:ext uri="{28A0092B-C50C-407E-A947-70E740481C1C}">
-                  <a14:useLocalDpi xmlns:a14="http://schemas.microsoft.com/office/drawing/2010/main" xmlns="" val="0"/>
+                  <a14:useLocalDpi xmlns="" xmlns:a14="http://schemas.microsoft.com/office/drawing/2010/main" val="0"/>
                 </a:ext>
               </a:extLst>
             </a:blip>
@@ -4747,7 +4731,7 @@
             <a:noFill/>
             <a:extLst>
               <a:ext uri="{909E8E84-426E-40DD-AFC4-6F175D3DCCD1}">
-                <a14:hiddenFill xmlns:a14="http://schemas.microsoft.com/office/drawing/2010/main" xmlns="">
+                <a14:hiddenFill xmlns="" xmlns:a14="http://schemas.microsoft.com/office/drawing/2010/main">
                   <a:solidFill>
                     <a:srgbClr val="FFFFFF"/>
                   </a:solidFill>
@@ -5115,7 +5099,7 @@
               <a:buChar char="•"/>
             </a:pPr>
             <a:r>
-              <a:rPr lang="en-US" sz="4000" b="1" dirty="0" smtClean="0"/>
+              <a:rPr lang="en-US" sz="4000" dirty="0" smtClean="0"/>
               <a:t>File size restrictions</a:t>
             </a:r>
           </a:p>
@@ -5128,7 +5112,7 @@
               <a:buChar char="•"/>
             </a:pPr>
             <a:r>
-              <a:rPr lang="en-US" sz="4000" b="1" dirty="0" smtClean="0"/>
+              <a:rPr lang="en-US" sz="4000" dirty="0" smtClean="0"/>
               <a:t>Per-user restrictions</a:t>
             </a:r>
           </a:p>
@@ -5141,14 +5125,10 @@
               <a:buChar char="•"/>
             </a:pPr>
             <a:r>
-              <a:rPr lang="en-US" sz="4000" b="1" dirty="0" smtClean="0"/>
-              <a:t>Subscription </a:t>
-            </a:r>
-            <a:r>
-              <a:rPr lang="en-US" sz="4000" b="1" dirty="0" smtClean="0"/>
-              <a:t>services</a:t>
-            </a:r>
-            <a:endParaRPr lang="en-US" sz="4000" b="1" dirty="0"/>
+              <a:rPr lang="en-US" sz="4000" dirty="0" smtClean="0"/>
+              <a:t>Subscription services</a:t>
+            </a:r>
+            <a:endParaRPr lang="en-US" sz="4000" dirty="0"/>
           </a:p>
         </p:txBody>
       </p:sp>
@@ -5725,7 +5705,7 @@
               <a:buChar char="•"/>
             </a:pPr>
             <a:r>
-              <a:rPr lang="en-US" sz="4000" b="1" dirty="0" smtClean="0"/>
+              <a:rPr lang="en-US" sz="4000" dirty="0" smtClean="0"/>
               <a:t>File upload compression</a:t>
             </a:r>
           </a:p>
@@ -5738,16 +5718,8 @@
               <a:buChar char="•"/>
             </a:pPr>
             <a:r>
-              <a:rPr lang="en-US" sz="4000" b="1" dirty="0" smtClean="0"/>
-              <a:t>Upload </a:t>
-            </a:r>
-            <a:r>
-              <a:rPr lang="en-US" sz="4000" b="1" dirty="0" smtClean="0"/>
-              <a:t>expiration </a:t>
-            </a:r>
-            <a:r>
-              <a:rPr lang="en-US" sz="4000" b="1" dirty="0" smtClean="0"/>
-              <a:t>times</a:t>
+              <a:rPr lang="en-US" sz="4000" dirty="0" smtClean="0"/>
+              <a:t>Upload expiration times</a:t>
             </a:r>
           </a:p>
         </p:txBody>

</xml_diff>

<commit_message>
Think I finished the poster, maybe presentation too!
</commit_message>
<xml_diff>
--- a/Senior/Thesis/Thesis Document/Poster/licastb_poster.pptx
+++ b/Senior/Thesis/Thesis Document/Poster/licastb_poster.pptx
@@ -557,7 +557,7 @@
     </p:spTree>
     <p:extLst>
       <p:ext uri="{BB962C8B-B14F-4D97-AF65-F5344CB8AC3E}">
-        <p14:creationId xmlns="" xmlns:p14="http://schemas.microsoft.com/office/powerpoint/2010/main" val="4021353523"/>
+        <p14:creationId xmlns:p14="http://schemas.microsoft.com/office/powerpoint/2010/main" xmlns="" val="4021353523"/>
       </p:ext>
     </p:extLst>
   </p:cSld>
@@ -4392,7 +4392,15 @@
             </a:pPr>
             <a:r>
               <a:rPr lang="en-US" sz="4000" dirty="0" smtClean="0"/>
-              <a:t>When evaluating the efficacy of the research, several groups of images were developed containing unique and duplicate images in various sizes. Metrics recorded processing time, detection rates, and storage requirements.</a:t>
+              <a:t>When evaluating the efficacy of the research, several groups of images were developed containing unique and duplicate images in various sizes. Metrics </a:t>
+            </a:r>
+            <a:r>
+              <a:rPr lang="en-US" sz="4000" dirty="0" smtClean="0"/>
+              <a:t>recorded include processing </a:t>
+            </a:r>
+            <a:r>
+              <a:rPr lang="en-US" sz="4000" dirty="0" smtClean="0"/>
+              <a:t>time, detection rates, and storage requirements.</a:t>
             </a:r>
           </a:p>
           <a:p>
@@ -4415,7 +4423,19 @@
             </a:pPr>
             <a:r>
               <a:rPr lang="en-US" sz="4000" dirty="0" smtClean="0"/>
-              <a:t>Processing times increased, but remained less than two seconds in observed scenarios, as seen in Figure 3.</a:t>
+              <a:t>Processing times increased, but </a:t>
+            </a:r>
+            <a:r>
+              <a:rPr lang="en-US" sz="4000" dirty="0" smtClean="0"/>
+              <a:t>remained </a:t>
+            </a:r>
+            <a:r>
+              <a:rPr lang="en-US" sz="4000" dirty="0" smtClean="0"/>
+              <a:t>less </a:t>
+            </a:r>
+            <a:r>
+              <a:rPr lang="en-US" sz="4000" dirty="0" smtClean="0"/>
+              <a:t>than two seconds in observed scenarios, as seen in Figure 3.</a:t>
             </a:r>
           </a:p>
         </p:txBody>
@@ -4578,7 +4598,7 @@
             <a:blip r:embed="rId4" cstate="print">
               <a:extLst>
                 <a:ext uri="{28A0092B-C50C-407E-A947-70E740481C1C}">
-                  <a14:useLocalDpi xmlns="" xmlns:a14="http://schemas.microsoft.com/office/drawing/2010/main" val="0"/>
+                  <a14:useLocalDpi xmlns:a14="http://schemas.microsoft.com/office/drawing/2010/main" xmlns="" val="0"/>
                 </a:ext>
               </a:extLst>
             </a:blip>
@@ -4598,7 +4618,7 @@
             <a:noFill/>
             <a:extLst>
               <a:ext uri="{909E8E84-426E-40DD-AFC4-6F175D3DCCD1}">
-                <a14:hiddenFill xmlns="" xmlns:a14="http://schemas.microsoft.com/office/drawing/2010/main">
+                <a14:hiddenFill xmlns:a14="http://schemas.microsoft.com/office/drawing/2010/main" xmlns="">
                   <a:solidFill>
                     <a:srgbClr val="FFFFFF"/>
                   </a:solidFill>
@@ -4619,7 +4639,7 @@
             <a:blip r:embed="rId5" cstate="print">
               <a:extLst>
                 <a:ext uri="{28A0092B-C50C-407E-A947-70E740481C1C}">
-                  <a14:useLocalDpi xmlns="" xmlns:a14="http://schemas.microsoft.com/office/drawing/2010/main" val="0"/>
+                  <a14:useLocalDpi xmlns:a14="http://schemas.microsoft.com/office/drawing/2010/main" xmlns="" val="0"/>
                 </a:ext>
               </a:extLst>
             </a:blip>
@@ -4639,7 +4659,7 @@
             <a:noFill/>
             <a:extLst>
               <a:ext uri="{909E8E84-426E-40DD-AFC4-6F175D3DCCD1}">
-                <a14:hiddenFill xmlns="" xmlns:a14="http://schemas.microsoft.com/office/drawing/2010/main">
+                <a14:hiddenFill xmlns:a14="http://schemas.microsoft.com/office/drawing/2010/main" xmlns="">
                   <a:solidFill>
                     <a:srgbClr val="FFFFFF"/>
                   </a:solidFill>
@@ -4670,7 +4690,7 @@
               </a:clrChange>
               <a:extLst>
                 <a:ext uri="{28A0092B-C50C-407E-A947-70E740481C1C}">
-                  <a14:useLocalDpi xmlns="" xmlns:a14="http://schemas.microsoft.com/office/drawing/2010/main" val="0"/>
+                  <a14:useLocalDpi xmlns:a14="http://schemas.microsoft.com/office/drawing/2010/main" xmlns="" val="0"/>
                 </a:ext>
               </a:extLst>
             </a:blip>
@@ -4690,7 +4710,7 @@
             <a:noFill/>
             <a:extLst>
               <a:ext uri="{909E8E84-426E-40DD-AFC4-6F175D3DCCD1}">
-                <a14:hiddenFill xmlns="" xmlns:a14="http://schemas.microsoft.com/office/drawing/2010/main">
+                <a14:hiddenFill xmlns:a14="http://schemas.microsoft.com/office/drawing/2010/main" xmlns="">
                   <a:solidFill>
                     <a:srgbClr val="FFFFFF"/>
                   </a:solidFill>
@@ -4711,7 +4731,7 @@
             <a:blip r:embed="rId7" cstate="print">
               <a:extLst>
                 <a:ext uri="{28A0092B-C50C-407E-A947-70E740481C1C}">
-                  <a14:useLocalDpi xmlns="" xmlns:a14="http://schemas.microsoft.com/office/drawing/2010/main" val="0"/>
+                  <a14:useLocalDpi xmlns:a14="http://schemas.microsoft.com/office/drawing/2010/main" xmlns="" val="0"/>
                 </a:ext>
               </a:extLst>
             </a:blip>
@@ -4731,7 +4751,7 @@
             <a:noFill/>
             <a:extLst>
               <a:ext uri="{909E8E84-426E-40DD-AFC4-6F175D3DCCD1}">
-                <a14:hiddenFill xmlns="" xmlns:a14="http://schemas.microsoft.com/office/drawing/2010/main">
+                <a14:hiddenFill xmlns:a14="http://schemas.microsoft.com/office/drawing/2010/main" xmlns="">
                   <a:solidFill>
                     <a:srgbClr val="FFFFFF"/>
                   </a:solidFill>
@@ -4830,8 +4850,8 @@
         </p:nvSpPr>
         <p:spPr bwMode="auto">
           <a:xfrm>
-            <a:off x="1143000" y="18973800"/>
-            <a:ext cx="13106400" cy="4648200"/>
+            <a:off x="914400" y="18973800"/>
+            <a:ext cx="13411200" cy="4648200"/>
           </a:xfrm>
           <a:prstGeom prst="rect">
             <a:avLst/>
@@ -4858,7 +4878,23 @@
             </a:pPr>
             <a:r>
               <a:rPr lang="en-US" sz="4000" dirty="0" smtClean="0"/>
-              <a:t>As of May 2013, nearly 500 million images are shared each day. This is expected to double by May 2014. [1]</a:t>
+              <a:t>As of May 2013, nearly 500 </a:t>
+            </a:r>
+            <a:r>
+              <a:rPr lang="en-US" sz="4000" dirty="0" smtClean="0"/>
+              <a:t>million images were shared </a:t>
+            </a:r>
+            <a:r>
+              <a:rPr lang="en-US" sz="4000" dirty="0" smtClean="0"/>
+              <a:t>each </a:t>
+            </a:r>
+            <a:r>
+              <a:rPr lang="en-US" sz="4000" dirty="0" smtClean="0"/>
+              <a:t>day. This is </a:t>
+            </a:r>
+            <a:r>
+              <a:rPr lang="en-US" sz="4000" dirty="0" smtClean="0"/>
+              <a:t>expected to double by May 2014. [1]</a:t>
             </a:r>
           </a:p>
           <a:p>
@@ -4871,7 +4907,15 @@
             </a:pPr>
             <a:r>
               <a:rPr lang="en-US" sz="4000" dirty="0" smtClean="0"/>
-              <a:t>Approximately 20% of this is data is estimated to be duplicate. [2]</a:t>
+              <a:t>Approximately 20% of this </a:t>
+            </a:r>
+            <a:r>
+              <a:rPr lang="en-US" sz="4000" dirty="0" smtClean="0"/>
+              <a:t>data </a:t>
+            </a:r>
+            <a:r>
+              <a:rPr lang="en-US" sz="4000" dirty="0" smtClean="0"/>
+              <a:t>is estimated to be duplicate. [2]</a:t>
             </a:r>
           </a:p>
           <a:p>
@@ -4884,7 +4928,23 @@
             </a:pPr>
             <a:r>
               <a:rPr lang="en-US" sz="4000" dirty="0" smtClean="0"/>
-              <a:t>By eliminating this data, companies can save roughly $1.8 million annually.</a:t>
+              <a:t>By eliminating this </a:t>
+            </a:r>
+            <a:r>
+              <a:rPr lang="en-US" sz="4000" dirty="0" smtClean="0"/>
+              <a:t>duplicate data</a:t>
+            </a:r>
+            <a:r>
+              <a:rPr lang="en-US" sz="4000" dirty="0" smtClean="0"/>
+              <a:t>, companies can </a:t>
+            </a:r>
+            <a:r>
+              <a:rPr lang="en-US" sz="4000" dirty="0" smtClean="0"/>
+              <a:t>save roughly $</a:t>
+            </a:r>
+            <a:r>
+              <a:rPr lang="en-US" sz="4000" dirty="0" smtClean="0"/>
+              <a:t>1.8 million annually.</a:t>
             </a:r>
           </a:p>
           <a:p>
@@ -5087,7 +5147,15 @@
             </a:pPr>
             <a:r>
               <a:rPr lang="en-US" sz="4000" dirty="0" smtClean="0"/>
-              <a:t>Currently several technologies are used to reduce the costs associated with storing the shared data including:</a:t>
+              <a:t>Currently several technologies are used to reduce the costs associated with </a:t>
+            </a:r>
+            <a:r>
+              <a:rPr lang="en-US" sz="4000" dirty="0" smtClean="0"/>
+              <a:t>storing the </a:t>
+            </a:r>
+            <a:r>
+              <a:rPr lang="en-US" sz="4000" dirty="0" smtClean="0"/>
+              <a:t>shared data including:</a:t>
             </a:r>
           </a:p>
           <a:p>

</xml_diff>

<commit_message>
Still updating final documents!
</commit_message>
<xml_diff>
--- a/Senior/Thesis/Thesis Document/Poster/licastb_poster.pptx
+++ b/Senior/Thesis/Thesis Document/Poster/licastb_poster.pptx
@@ -143,6 +143,285 @@
 </p:presentation>
 </file>
 
+<file path=ppt/charts/chart1.xml><?xml version="1.0" encoding="utf-8"?>
+<c:chartSpace xmlns:c="http://schemas.openxmlformats.org/drawingml/2006/chart" xmlns:a="http://schemas.openxmlformats.org/drawingml/2006/main" xmlns:r="http://schemas.openxmlformats.org/officeDocument/2006/relationships">
+  <c:lang val="en-US"/>
+  <c:chart>
+    <c:plotArea>
+      <c:layout>
+        <c:manualLayout>
+          <c:layoutTarget val="inner"/>
+          <c:xMode val="edge"/>
+          <c:yMode val="edge"/>
+          <c:x val="0.10749284180386542"/>
+          <c:y val="3.6184210526315791E-2"/>
+          <c:w val="0.66558905989024097"/>
+          <c:h val="0.87265368144771382"/>
+        </c:manualLayout>
+      </c:layout>
+      <c:barChart>
+        <c:barDir val="col"/>
+        <c:grouping val="clustered"/>
+        <c:ser>
+          <c:idx val="0"/>
+          <c:order val="0"/>
+          <c:tx>
+            <c:strRef>
+              <c:f>Sheet1!$B$1</c:f>
+              <c:strCache>
+                <c:ptCount val="1"/>
+                <c:pt idx="0">
+                  <c:v>Traditional Upload</c:v>
+                </c:pt>
+              </c:strCache>
+            </c:strRef>
+          </c:tx>
+          <c:spPr>
+            <a:solidFill>
+              <a:srgbClr val="9E6900"/>
+            </a:solidFill>
+            <a:ln>
+              <a:solidFill>
+                <a:srgbClr val="CC9900"/>
+              </a:solidFill>
+            </a:ln>
+          </c:spPr>
+          <c:cat>
+            <c:strRef>
+              <c:f>Sheet1!$A$2:$A$3</c:f>
+              <c:strCache>
+                <c:ptCount val="2"/>
+                <c:pt idx="0">
+                  <c:v>File Size &lt;1MB</c:v>
+                </c:pt>
+                <c:pt idx="1">
+                  <c:v>File Size &gt;10MB</c:v>
+                </c:pt>
+              </c:strCache>
+            </c:strRef>
+          </c:cat>
+          <c:val>
+            <c:numRef>
+              <c:f>Sheet1!$B$2:$B$3</c:f>
+              <c:numCache>
+                <c:formatCode>General</c:formatCode>
+                <c:ptCount val="2"/>
+                <c:pt idx="0">
+                  <c:v>0.05</c:v>
+                </c:pt>
+                <c:pt idx="1">
+                  <c:v>0.06</c:v>
+                </c:pt>
+              </c:numCache>
+            </c:numRef>
+          </c:val>
+        </c:ser>
+        <c:ser>
+          <c:idx val="1"/>
+          <c:order val="1"/>
+          <c:tx>
+            <c:strRef>
+              <c:f>Sheet1!$C$1</c:f>
+              <c:strCache>
+                <c:ptCount val="1"/>
+                <c:pt idx="0">
+                  <c:v>Duplicate Reduced With Duplicates</c:v>
+                </c:pt>
+              </c:strCache>
+            </c:strRef>
+          </c:tx>
+          <c:spPr>
+            <a:solidFill>
+              <a:srgbClr val="FFCC00"/>
+            </a:solidFill>
+            <a:ln>
+              <a:solidFill>
+                <a:srgbClr val="FFCC00"/>
+              </a:solidFill>
+            </a:ln>
+          </c:spPr>
+          <c:cat>
+            <c:strRef>
+              <c:f>Sheet1!$A$2:$A$3</c:f>
+              <c:strCache>
+                <c:ptCount val="2"/>
+                <c:pt idx="0">
+                  <c:v>File Size &lt;1MB</c:v>
+                </c:pt>
+                <c:pt idx="1">
+                  <c:v>File Size &gt;10MB</c:v>
+                </c:pt>
+              </c:strCache>
+            </c:strRef>
+          </c:cat>
+          <c:val>
+            <c:numRef>
+              <c:f>Sheet1!$C$2:$C$3</c:f>
+              <c:numCache>
+                <c:formatCode>General</c:formatCode>
+                <c:ptCount val="2"/>
+                <c:pt idx="0">
+                  <c:v>0.1</c:v>
+                </c:pt>
+                <c:pt idx="1">
+                  <c:v>1</c:v>
+                </c:pt>
+              </c:numCache>
+            </c:numRef>
+          </c:val>
+        </c:ser>
+        <c:ser>
+          <c:idx val="2"/>
+          <c:order val="2"/>
+          <c:tx>
+            <c:strRef>
+              <c:f>Sheet1!$D$1</c:f>
+              <c:strCache>
+                <c:ptCount val="1"/>
+                <c:pt idx="0">
+                  <c:v>Duplicate Reduced Without Duplicates</c:v>
+                </c:pt>
+              </c:strCache>
+            </c:strRef>
+          </c:tx>
+          <c:spPr>
+            <a:solidFill>
+              <a:srgbClr val="C00000"/>
+            </a:solidFill>
+            <a:ln>
+              <a:solidFill>
+                <a:srgbClr val="C00000"/>
+              </a:solidFill>
+            </a:ln>
+          </c:spPr>
+          <c:cat>
+            <c:strRef>
+              <c:f>Sheet1!$A$2:$A$3</c:f>
+              <c:strCache>
+                <c:ptCount val="2"/>
+                <c:pt idx="0">
+                  <c:v>File Size &lt;1MB</c:v>
+                </c:pt>
+                <c:pt idx="1">
+                  <c:v>File Size &gt;10MB</c:v>
+                </c:pt>
+              </c:strCache>
+            </c:strRef>
+          </c:cat>
+          <c:val>
+            <c:numRef>
+              <c:f>Sheet1!$D$2:$D$3</c:f>
+              <c:numCache>
+                <c:formatCode>General</c:formatCode>
+                <c:ptCount val="2"/>
+                <c:pt idx="0">
+                  <c:v>0.15</c:v>
+                </c:pt>
+                <c:pt idx="1">
+                  <c:v>1.56</c:v>
+                </c:pt>
+              </c:numCache>
+            </c:numRef>
+          </c:val>
+        </c:ser>
+        <c:axId val="111359104"/>
+        <c:axId val="111360640"/>
+      </c:barChart>
+      <c:catAx>
+        <c:axId val="111359104"/>
+        <c:scaling>
+          <c:orientation val="minMax"/>
+        </c:scaling>
+        <c:axPos val="b"/>
+        <c:tickLblPos val="nextTo"/>
+        <c:txPr>
+          <a:bodyPr/>
+          <a:lstStyle/>
+          <a:p>
+            <a:pPr>
+              <a:defRPr b="1"/>
+            </a:pPr>
+            <a:endParaRPr lang="en-US"/>
+          </a:p>
+        </c:txPr>
+        <c:crossAx val="111360640"/>
+        <c:crosses val="autoZero"/>
+        <c:auto val="1"/>
+        <c:lblAlgn val="ctr"/>
+        <c:lblOffset val="100"/>
+      </c:catAx>
+      <c:valAx>
+        <c:axId val="111360640"/>
+        <c:scaling>
+          <c:orientation val="minMax"/>
+        </c:scaling>
+        <c:axPos val="l"/>
+        <c:majorGridlines/>
+        <c:title>
+          <c:tx>
+            <c:rich>
+              <a:bodyPr rot="-5400000" vert="horz"/>
+              <a:lstStyle/>
+              <a:p>
+                <a:pPr>
+                  <a:defRPr/>
+                </a:pPr>
+                <a:r>
+                  <a:rPr lang="en-US" dirty="0"/>
+                  <a:t>Processing </a:t>
+                </a:r>
+                <a:r>
+                  <a:rPr lang="en-US" b="1" dirty="0"/>
+                  <a:t>Time</a:t>
+                </a:r>
+                <a:r>
+                  <a:rPr lang="en-US" dirty="0"/>
+                  <a:t> (Seconds)</a:t>
+                </a:r>
+              </a:p>
+            </c:rich>
+          </c:tx>
+          <c:layout/>
+        </c:title>
+        <c:numFmt formatCode="General" sourceLinked="1"/>
+        <c:tickLblPos val="nextTo"/>
+        <c:crossAx val="111359104"/>
+        <c:crosses val="autoZero"/>
+        <c:crossBetween val="between"/>
+      </c:valAx>
+    </c:plotArea>
+    <c:legend>
+      <c:legendPos val="r"/>
+      <c:layout>
+        <c:manualLayout>
+          <c:xMode val="edge"/>
+          <c:yMode val="edge"/>
+          <c:x val="0.78980039071820562"/>
+          <c:y val="0.15876450476585163"/>
+          <c:w val="0.19586371429004901"/>
+          <c:h val="0.6693130957314547"/>
+        </c:manualLayout>
+      </c:layout>
+    </c:legend>
+    <c:plotVisOnly val="1"/>
+  </c:chart>
+  <c:txPr>
+    <a:bodyPr/>
+    <a:lstStyle/>
+    <a:p>
+      <a:pPr>
+        <a:defRPr sz="2600">
+          <a:latin typeface="Arial" pitchFamily="34" charset="0"/>
+          <a:cs typeface="Arial" pitchFamily="34" charset="0"/>
+        </a:defRPr>
+      </a:pPr>
+      <a:endParaRPr lang="en-US"/>
+    </a:p>
+  </c:txPr>
+  <c:externalData r:id="rId1"/>
+</c:chartSpace>
+</file>
+
 <file path=ppt/handoutMasters/handoutMaster1.xml><?xml version="1.0" encoding="utf-8"?>
 <p:handoutMaster xmlns:a="http://schemas.openxmlformats.org/drawingml/2006/main" xmlns:r="http://schemas.openxmlformats.org/officeDocument/2006/relationships" xmlns:p="http://schemas.openxmlformats.org/presentationml/2006/main">
   <p:cSld>
@@ -226,7 +505,7 @@
             <a:fld id="{D9B4BE8C-1C96-469A-84FD-5AAEAF4A58B1}" type="datetimeFigureOut">
               <a:rPr lang="en-US" smtClean="0"/>
               <a:pPr/>
-              <a:t>4/14/2014</a:t>
+              <a:t>4/15/2014</a:t>
             </a:fld>
             <a:endParaRPr lang="en-US"/>
           </a:p>
@@ -388,7 +667,7 @@
             <a:fld id="{8DC8B27C-975C-42A0-BCBC-A5FB229B0A17}" type="datetimeFigureOut">
               <a:rPr lang="en-US" smtClean="0"/>
               <a:pPr/>
-              <a:t>4/14/2014</a:t>
+              <a:t>4/15/2014</a:t>
             </a:fld>
             <a:endParaRPr lang="en-US"/>
           </a:p>
@@ -557,7 +836,7 @@
     </p:spTree>
     <p:extLst>
       <p:ext uri="{BB962C8B-B14F-4D97-AF65-F5344CB8AC3E}">
-        <p14:creationId xmlns:p14="http://schemas.microsoft.com/office/powerpoint/2010/main" xmlns="" val="4021353523"/>
+        <p14:creationId xmlns="" xmlns:p14="http://schemas.microsoft.com/office/powerpoint/2010/main" val="4021353523"/>
       </p:ext>
     </p:extLst>
   </p:cSld>
@@ -4392,15 +4671,7 @@
             </a:pPr>
             <a:r>
               <a:rPr lang="en-US" sz="4000" dirty="0" smtClean="0"/>
-              <a:t>When evaluating the efficacy of the research, several groups of images were developed containing unique and duplicate images in various sizes. Metrics </a:t>
-            </a:r>
-            <a:r>
-              <a:rPr lang="en-US" sz="4000" dirty="0" smtClean="0"/>
-              <a:t>recorded include processing </a:t>
-            </a:r>
-            <a:r>
-              <a:rPr lang="en-US" sz="4000" dirty="0" smtClean="0"/>
-              <a:t>time, detection rates, and storage requirements.</a:t>
+              <a:t>When evaluating the efficacy of the research, several groups of images were developed containing unique and duplicate images in various sizes. Metrics recorded include processing time, detection rates, and storage requirements.</a:t>
             </a:r>
           </a:p>
           <a:p>
@@ -4423,19 +4694,7 @@
             </a:pPr>
             <a:r>
               <a:rPr lang="en-US" sz="4000" dirty="0" smtClean="0"/>
-              <a:t>Processing times increased, but </a:t>
-            </a:r>
-            <a:r>
-              <a:rPr lang="en-US" sz="4000" dirty="0" smtClean="0"/>
-              <a:t>remained </a:t>
-            </a:r>
-            <a:r>
-              <a:rPr lang="en-US" sz="4000" dirty="0" smtClean="0"/>
-              <a:t>less </a:t>
-            </a:r>
-            <a:r>
-              <a:rPr lang="en-US" sz="4000" dirty="0" smtClean="0"/>
-              <a:t>than two seconds in observed scenarios, as seen in Figure 3.</a:t>
+              <a:t>Processing times increased, but remained less than two seconds in observed scenarios, as seen in Figure 3.</a:t>
             </a:r>
           </a:p>
         </p:txBody>
@@ -4598,7 +4857,7 @@
             <a:blip r:embed="rId4" cstate="print">
               <a:extLst>
                 <a:ext uri="{28A0092B-C50C-407E-A947-70E740481C1C}">
-                  <a14:useLocalDpi xmlns:a14="http://schemas.microsoft.com/office/drawing/2010/main" xmlns="" val="0"/>
+                  <a14:useLocalDpi xmlns="" xmlns:a14="http://schemas.microsoft.com/office/drawing/2010/main" val="0"/>
                 </a:ext>
               </a:extLst>
             </a:blip>
@@ -4618,7 +4877,7 @@
             <a:noFill/>
             <a:extLst>
               <a:ext uri="{909E8E84-426E-40DD-AFC4-6F175D3DCCD1}">
-                <a14:hiddenFill xmlns:a14="http://schemas.microsoft.com/office/drawing/2010/main" xmlns="">
+                <a14:hiddenFill xmlns="" xmlns:a14="http://schemas.microsoft.com/office/drawing/2010/main">
                   <a:solidFill>
                     <a:srgbClr val="FFFFFF"/>
                   </a:solidFill>
@@ -4639,7 +4898,7 @@
             <a:blip r:embed="rId5" cstate="print">
               <a:extLst>
                 <a:ext uri="{28A0092B-C50C-407E-A947-70E740481C1C}">
-                  <a14:useLocalDpi xmlns:a14="http://schemas.microsoft.com/office/drawing/2010/main" xmlns="" val="0"/>
+                  <a14:useLocalDpi xmlns="" xmlns:a14="http://schemas.microsoft.com/office/drawing/2010/main" val="0"/>
                 </a:ext>
               </a:extLst>
             </a:blip>
@@ -4659,7 +4918,7 @@
             <a:noFill/>
             <a:extLst>
               <a:ext uri="{909E8E84-426E-40DD-AFC4-6F175D3DCCD1}">
-                <a14:hiddenFill xmlns:a14="http://schemas.microsoft.com/office/drawing/2010/main" xmlns="">
+                <a14:hiddenFill xmlns="" xmlns:a14="http://schemas.microsoft.com/office/drawing/2010/main">
                   <a:solidFill>
                     <a:srgbClr val="FFFFFF"/>
                   </a:solidFill>
@@ -4690,7 +4949,7 @@
               </a:clrChange>
               <a:extLst>
                 <a:ext uri="{28A0092B-C50C-407E-A947-70E740481C1C}">
-                  <a14:useLocalDpi xmlns:a14="http://schemas.microsoft.com/office/drawing/2010/main" xmlns="" val="0"/>
+                  <a14:useLocalDpi xmlns="" xmlns:a14="http://schemas.microsoft.com/office/drawing/2010/main" val="0"/>
                 </a:ext>
               </a:extLst>
             </a:blip>
@@ -4710,7 +4969,7 @@
             <a:noFill/>
             <a:extLst>
               <a:ext uri="{909E8E84-426E-40DD-AFC4-6F175D3DCCD1}">
-                <a14:hiddenFill xmlns:a14="http://schemas.microsoft.com/office/drawing/2010/main" xmlns="">
+                <a14:hiddenFill xmlns="" xmlns:a14="http://schemas.microsoft.com/office/drawing/2010/main">
                   <a:solidFill>
                     <a:srgbClr val="FFFFFF"/>
                   </a:solidFill>
@@ -4731,7 +4990,7 @@
             <a:blip r:embed="rId7" cstate="print">
               <a:extLst>
                 <a:ext uri="{28A0092B-C50C-407E-A947-70E740481C1C}">
-                  <a14:useLocalDpi xmlns:a14="http://schemas.microsoft.com/office/drawing/2010/main" xmlns="" val="0"/>
+                  <a14:useLocalDpi xmlns="" xmlns:a14="http://schemas.microsoft.com/office/drawing/2010/main" val="0"/>
                 </a:ext>
               </a:extLst>
             </a:blip>
@@ -4751,7 +5010,7 @@
             <a:noFill/>
             <a:extLst>
               <a:ext uri="{909E8E84-426E-40DD-AFC4-6F175D3DCCD1}">
-                <a14:hiddenFill xmlns:a14="http://schemas.microsoft.com/office/drawing/2010/main" xmlns="">
+                <a14:hiddenFill xmlns="" xmlns:a14="http://schemas.microsoft.com/office/drawing/2010/main">
                   <a:solidFill>
                     <a:srgbClr val="FFFFFF"/>
                   </a:solidFill>
@@ -4878,23 +5137,7 @@
             </a:pPr>
             <a:r>
               <a:rPr lang="en-US" sz="4000" dirty="0" smtClean="0"/>
-              <a:t>As of May 2013, nearly 500 </a:t>
-            </a:r>
-            <a:r>
-              <a:rPr lang="en-US" sz="4000" dirty="0" smtClean="0"/>
-              <a:t>million images were shared </a:t>
-            </a:r>
-            <a:r>
-              <a:rPr lang="en-US" sz="4000" dirty="0" smtClean="0"/>
-              <a:t>each </a:t>
-            </a:r>
-            <a:r>
-              <a:rPr lang="en-US" sz="4000" dirty="0" smtClean="0"/>
-              <a:t>day. This is </a:t>
-            </a:r>
-            <a:r>
-              <a:rPr lang="en-US" sz="4000" dirty="0" smtClean="0"/>
-              <a:t>expected to double by May 2014. [1]</a:t>
+              <a:t>As of May 2013, nearly 500 million images were shared each day. This is expected to double by Dec 2014 [1].</a:t>
             </a:r>
           </a:p>
           <a:p>
@@ -4907,15 +5150,7 @@
             </a:pPr>
             <a:r>
               <a:rPr lang="en-US" sz="4000" dirty="0" smtClean="0"/>
-              <a:t>Approximately 20% of this </a:t>
-            </a:r>
-            <a:r>
-              <a:rPr lang="en-US" sz="4000" dirty="0" smtClean="0"/>
-              <a:t>data </a:t>
-            </a:r>
-            <a:r>
-              <a:rPr lang="en-US" sz="4000" dirty="0" smtClean="0"/>
-              <a:t>is estimated to be duplicate. [2]</a:t>
+              <a:t>Approximately 20% of this data is estimated to be duplicate [2].</a:t>
             </a:r>
           </a:p>
           <a:p>
@@ -4928,23 +5163,7 @@
             </a:pPr>
             <a:r>
               <a:rPr lang="en-US" sz="4000" dirty="0" smtClean="0"/>
-              <a:t>By eliminating this </a:t>
-            </a:r>
-            <a:r>
-              <a:rPr lang="en-US" sz="4000" dirty="0" smtClean="0"/>
-              <a:t>duplicate data</a:t>
-            </a:r>
-            <a:r>
-              <a:rPr lang="en-US" sz="4000" dirty="0" smtClean="0"/>
-              <a:t>, companies can </a:t>
-            </a:r>
-            <a:r>
-              <a:rPr lang="en-US" sz="4000" dirty="0" smtClean="0"/>
-              <a:t>save roughly $</a:t>
-            </a:r>
-            <a:r>
-              <a:rPr lang="en-US" sz="4000" dirty="0" smtClean="0"/>
-              <a:t>1.8 million annually.</a:t>
+              <a:t>By eliminating this duplicate data, companies can save roughly $1.8 million annually.</a:t>
             </a:r>
           </a:p>
           <a:p>
@@ -5147,15 +5366,7 @@
             </a:pPr>
             <a:r>
               <a:rPr lang="en-US" sz="4000" dirty="0" smtClean="0"/>
-              <a:t>Currently several technologies are used to reduce the costs associated with </a:t>
-            </a:r>
-            <a:r>
-              <a:rPr lang="en-US" sz="4000" dirty="0" smtClean="0"/>
-              <a:t>storing the </a:t>
-            </a:r>
-            <a:r>
-              <a:rPr lang="en-US" sz="4000" dirty="0" smtClean="0"/>
-              <a:t>shared data including:</a:t>
+              <a:t>Currently several technologies are used to reduce the costs associated with storing the shared data including:</a:t>
             </a:r>
           </a:p>
           <a:p>
@@ -5720,32 +5931,6 @@
           </a:p>
         </p:txBody>
       </p:sp>
-      <p:pic>
-        <p:nvPicPr>
-          <p:cNvPr id="1027" name="Picture 3" descr="C:\Users\Braden\Documents\College\Senior\Thesis\Thesis Document\Poster\time_graph.png"/>
-          <p:cNvPicPr>
-            <a:picLocks noChangeAspect="1" noChangeArrowheads="1"/>
-          </p:cNvPicPr>
-          <p:nvPr/>
-        </p:nvPicPr>
-        <p:blipFill>
-          <a:blip r:embed="rId9" cstate="print"/>
-          <a:srcRect/>
-          <a:stretch>
-            <a:fillRect/>
-          </a:stretch>
-        </p:blipFill>
-        <p:spPr bwMode="auto">
-          <a:xfrm>
-            <a:off x="29870400" y="13411200"/>
-            <a:ext cx="12310714" cy="5638800"/>
-          </a:xfrm>
-          <a:prstGeom prst="rect">
-            <a:avLst/>
-          </a:prstGeom>
-          <a:noFill/>
-        </p:spPr>
-      </p:pic>
       <p:sp>
         <p:nvSpPr>
           <p:cNvPr id="37" name="TextBox 36"/>
@@ -5792,6 +5977,22 @@
           </a:p>
         </p:txBody>
       </p:sp>
+      <p:graphicFrame>
+        <p:nvGraphicFramePr>
+          <p:cNvPr id="38" name="Chart 37"/>
+          <p:cNvGraphicFramePr/>
+          <p:nvPr/>
+        </p:nvGraphicFramePr>
+        <p:xfrm>
+          <a:off x="29489400" y="13308725"/>
+          <a:ext cx="13411200" cy="5791200"/>
+        </p:xfrm>
+        <a:graphic>
+          <a:graphicData uri="http://schemas.openxmlformats.org/drawingml/2006/chart">
+            <c:chart xmlns:c="http://schemas.openxmlformats.org/drawingml/2006/chart" xmlns:r="http://schemas.openxmlformats.org/officeDocument/2006/relationships" r:id="rId9"/>
+          </a:graphicData>
+        </a:graphic>
+      </p:graphicFrame>
     </p:spTree>
   </p:cSld>
   <p:clrMapOvr>

</xml_diff>

<commit_message>
Poster not printing right?
</commit_message>
<xml_diff>
--- a/Senior/Thesis/Thesis Document/Poster/licastb_poster.pptx
+++ b/Senior/Thesis/Thesis Document/Poster/licastb_poster.pptx
@@ -154,7 +154,7 @@
           <c:xMode val="edge"/>
           <c:yMode val="edge"/>
           <c:x val="0.10749284180386542"/>
-          <c:y val="3.6184210526315791E-2"/>
+          <c:y val="3.6184210526315805E-2"/>
           <c:w val="0.66558905989024097"/>
           <c:h val="0.87265368144771382"/>
         </c:manualLayout>
@@ -207,10 +207,10 @@
                 <c:formatCode>General</c:formatCode>
                 <c:ptCount val="2"/>
                 <c:pt idx="0">
-                  <c:v>0.05</c:v>
+                  <c:v>5.000000000000001E-2</c:v>
                 </c:pt>
                 <c:pt idx="1">
-                  <c:v>0.06</c:v>
+                  <c:v>6.0000000000000012E-2</c:v>
                 </c:pt>
               </c:numCache>
             </c:numRef>
@@ -315,7 +315,7 @@
                 <c:formatCode>General</c:formatCode>
                 <c:ptCount val="2"/>
                 <c:pt idx="0">
-                  <c:v>0.15</c:v>
+                  <c:v>0.15000000000000002</c:v>
                 </c:pt>
                 <c:pt idx="1">
                   <c:v>1.56</c:v>
@@ -324,39 +324,62 @@
             </c:numRef>
           </c:val>
         </c:ser>
-        <c:axId val="111359104"/>
-        <c:axId val="111360640"/>
+        <c:dLbls>
+          <c:dLblPos val="outEnd"/>
+          <c:showVal val="1"/>
+        </c:dLbls>
+        <c:axId val="75202560"/>
+        <c:axId val="75204096"/>
       </c:barChart>
       <c:catAx>
-        <c:axId val="111359104"/>
+        <c:axId val="75202560"/>
         <c:scaling>
           <c:orientation val="minMax"/>
         </c:scaling>
         <c:axPos val="b"/>
         <c:tickLblPos val="nextTo"/>
-        <c:txPr>
-          <a:bodyPr/>
-          <a:lstStyle/>
-          <a:p>
-            <a:pPr>
-              <a:defRPr b="1"/>
-            </a:pPr>
-            <a:endParaRPr lang="en-US"/>
-          </a:p>
-        </c:txPr>
-        <c:crossAx val="111360640"/>
+        <c:spPr>
+          <a:noFill/>
+          <a:ln w="25400" cap="flat" cmpd="sng" algn="ctr">
+            <a:solidFill>
+              <a:schemeClr val="accent4"/>
+            </a:solidFill>
+            <a:prstDash val="solid"/>
+          </a:ln>
+          <a:effectLst>
+            <a:outerShdw blurRad="40000" dist="20000" dir="5400000" rotWithShape="0">
+              <a:srgbClr val="000000">
+                <a:alpha val="38000"/>
+              </a:srgbClr>
+            </a:outerShdw>
+          </a:effectLst>
+        </c:spPr>
+        <c:crossAx val="75204096"/>
         <c:crosses val="autoZero"/>
         <c:auto val="1"/>
         <c:lblAlgn val="ctr"/>
         <c:lblOffset val="100"/>
       </c:catAx>
       <c:valAx>
-        <c:axId val="111360640"/>
+        <c:axId val="75204096"/>
         <c:scaling>
           <c:orientation val="minMax"/>
         </c:scaling>
         <c:axPos val="l"/>
-        <c:majorGridlines/>
+        <c:majorGridlines>
+          <c:spPr>
+            <a:ln w="19050" cap="flat" cmpd="sng" algn="ctr">
+              <a:solidFill>
+                <a:schemeClr val="accent4">
+                  <a:shade val="95000"/>
+                  <a:satMod val="105000"/>
+                </a:schemeClr>
+              </a:solidFill>
+              <a:prstDash val="solid"/>
+            </a:ln>
+            <a:effectLst/>
+          </c:spPr>
+        </c:majorGridlines>
         <c:title>
           <c:tx>
             <c:rich>
@@ -367,25 +390,40 @@
                   <a:defRPr/>
                 </a:pPr>
                 <a:r>
-                  <a:rPr lang="en-US" dirty="0"/>
-                  <a:t>Processing </a:t>
-                </a:r>
-                <a:r>
-                  <a:rPr lang="en-US" b="1" dirty="0"/>
-                  <a:t>Time</a:t>
-                </a:r>
-                <a:r>
-                  <a:rPr lang="en-US" dirty="0"/>
-                  <a:t> (Seconds)</a:t>
+                  <a:rPr lang="en-US"/>
+                  <a:t>Processing Time (Seconds)</a:t>
                 </a:r>
               </a:p>
             </c:rich>
           </c:tx>
-          <c:layout/>
+          <c:layout>
+            <c:manualLayout>
+              <c:xMode val="edge"/>
+              <c:yMode val="edge"/>
+              <c:x val="1.7991604032450488E-2"/>
+              <c:y val="0.10691894598701478"/>
+            </c:manualLayout>
+          </c:layout>
         </c:title>
         <c:numFmt formatCode="General" sourceLinked="1"/>
         <c:tickLblPos val="nextTo"/>
-        <c:crossAx val="111359104"/>
+        <c:spPr>
+          <a:noFill/>
+          <a:ln w="25400" cap="flat" cmpd="sng" algn="ctr">
+            <a:solidFill>
+              <a:schemeClr val="dk1"/>
+            </a:solidFill>
+            <a:prstDash val="solid"/>
+          </a:ln>
+          <a:effectLst>
+            <a:outerShdw blurRad="40000" dist="20000" dir="5400000" rotWithShape="0">
+              <a:srgbClr val="000000">
+                <a:alpha val="38000"/>
+              </a:srgbClr>
+            </a:outerShdw>
+          </a:effectLst>
+        </c:spPr>
+        <c:crossAx val="75202560"/>
         <c:crosses val="autoZero"/>
         <c:crossBetween val="between"/>
       </c:valAx>
@@ -396,10 +434,10 @@
         <c:manualLayout>
           <c:xMode val="edge"/>
           <c:yMode val="edge"/>
-          <c:x val="0.78980039071820562"/>
-          <c:y val="0.15876450476585163"/>
+          <c:x val="0.78980039071820551"/>
+          <c:y val="0.15876450476585166"/>
           <c:w val="0.19586371429004901"/>
-          <c:h val="0.6693130957314547"/>
+          <c:h val="0.66931309573145459"/>
         </c:manualLayout>
       </c:layout>
     </c:legend>
@@ -410,7 +448,7 @@
     <a:lstStyle/>
     <a:p>
       <a:pPr>
-        <a:defRPr sz="2600">
+        <a:defRPr sz="2500">
           <a:latin typeface="Arial" pitchFamily="34" charset="0"/>
           <a:cs typeface="Arial" pitchFamily="34" charset="0"/>
         </a:defRPr>
@@ -836,7 +874,7 @@
     </p:spTree>
     <p:extLst>
       <p:ext uri="{BB962C8B-B14F-4D97-AF65-F5344CB8AC3E}">
-        <p14:creationId xmlns="" xmlns:p14="http://schemas.microsoft.com/office/powerpoint/2010/main" val="4021353523"/>
+        <p14:creationId xmlns:p14="http://schemas.microsoft.com/office/powerpoint/2010/main" xmlns="" val="4021353523"/>
       </p:ext>
     </p:extLst>
   </p:cSld>
@@ -4857,7 +4895,7 @@
             <a:blip r:embed="rId4" cstate="print">
               <a:extLst>
                 <a:ext uri="{28A0092B-C50C-407E-A947-70E740481C1C}">
-                  <a14:useLocalDpi xmlns="" xmlns:a14="http://schemas.microsoft.com/office/drawing/2010/main" val="0"/>
+                  <a14:useLocalDpi xmlns:a14="http://schemas.microsoft.com/office/drawing/2010/main" xmlns="" val="0"/>
                 </a:ext>
               </a:extLst>
             </a:blip>
@@ -4877,7 +4915,7 @@
             <a:noFill/>
             <a:extLst>
               <a:ext uri="{909E8E84-426E-40DD-AFC4-6F175D3DCCD1}">
-                <a14:hiddenFill xmlns="" xmlns:a14="http://schemas.microsoft.com/office/drawing/2010/main">
+                <a14:hiddenFill xmlns:a14="http://schemas.microsoft.com/office/drawing/2010/main" xmlns="">
                   <a:solidFill>
                     <a:srgbClr val="FFFFFF"/>
                   </a:solidFill>
@@ -4898,7 +4936,7 @@
             <a:blip r:embed="rId5" cstate="print">
               <a:extLst>
                 <a:ext uri="{28A0092B-C50C-407E-A947-70E740481C1C}">
-                  <a14:useLocalDpi xmlns="" xmlns:a14="http://schemas.microsoft.com/office/drawing/2010/main" val="0"/>
+                  <a14:useLocalDpi xmlns:a14="http://schemas.microsoft.com/office/drawing/2010/main" xmlns="" val="0"/>
                 </a:ext>
               </a:extLst>
             </a:blip>
@@ -4918,7 +4956,7 @@
             <a:noFill/>
             <a:extLst>
               <a:ext uri="{909E8E84-426E-40DD-AFC4-6F175D3DCCD1}">
-                <a14:hiddenFill xmlns="" xmlns:a14="http://schemas.microsoft.com/office/drawing/2010/main">
+                <a14:hiddenFill xmlns:a14="http://schemas.microsoft.com/office/drawing/2010/main" xmlns="">
                   <a:solidFill>
                     <a:srgbClr val="FFFFFF"/>
                   </a:solidFill>
@@ -4949,7 +4987,7 @@
               </a:clrChange>
               <a:extLst>
                 <a:ext uri="{28A0092B-C50C-407E-A947-70E740481C1C}">
-                  <a14:useLocalDpi xmlns="" xmlns:a14="http://schemas.microsoft.com/office/drawing/2010/main" val="0"/>
+                  <a14:useLocalDpi xmlns:a14="http://schemas.microsoft.com/office/drawing/2010/main" xmlns="" val="0"/>
                 </a:ext>
               </a:extLst>
             </a:blip>
@@ -4969,7 +5007,7 @@
             <a:noFill/>
             <a:extLst>
               <a:ext uri="{909E8E84-426E-40DD-AFC4-6F175D3DCCD1}">
-                <a14:hiddenFill xmlns="" xmlns:a14="http://schemas.microsoft.com/office/drawing/2010/main">
+                <a14:hiddenFill xmlns:a14="http://schemas.microsoft.com/office/drawing/2010/main" xmlns="">
                   <a:solidFill>
                     <a:srgbClr val="FFFFFF"/>
                   </a:solidFill>
@@ -4990,7 +5028,7 @@
             <a:blip r:embed="rId7" cstate="print">
               <a:extLst>
                 <a:ext uri="{28A0092B-C50C-407E-A947-70E740481C1C}">
-                  <a14:useLocalDpi xmlns="" xmlns:a14="http://schemas.microsoft.com/office/drawing/2010/main" val="0"/>
+                  <a14:useLocalDpi xmlns:a14="http://schemas.microsoft.com/office/drawing/2010/main" xmlns="" val="0"/>
                 </a:ext>
               </a:extLst>
             </a:blip>
@@ -5010,7 +5048,7 @@
             <a:noFill/>
             <a:extLst>
               <a:ext uri="{909E8E84-426E-40DD-AFC4-6F175D3DCCD1}">
-                <a14:hiddenFill xmlns="" xmlns:a14="http://schemas.microsoft.com/office/drawing/2010/main">
+                <a14:hiddenFill xmlns:a14="http://schemas.microsoft.com/office/drawing/2010/main" xmlns="">
                   <a:solidFill>
                     <a:srgbClr val="FFFFFF"/>
                   </a:solidFill>

</xml_diff>